<commit_message>
Updated HLD and code cleanup
</commit_message>
<xml_diff>
--- a/resources/High Level Design.pptx
+++ b/resources/High Level Design.pptx
@@ -4,10 +4,19 @@
   <p:sldMasterIdLst>
     <p:sldMasterId id="2147483648" r:id="rId1"/>
   </p:sldMasterIdLst>
+  <p:notesMasterIdLst>
+    <p:notesMasterId r:id="rId11"/>
+  </p:notesMasterIdLst>
   <p:sldIdLst>
     <p:sldId id="256" r:id="rId2"/>
-    <p:sldId id="257" r:id="rId3"/>
-    <p:sldId id="258" r:id="rId4"/>
+    <p:sldId id="260" r:id="rId3"/>
+    <p:sldId id="262" r:id="rId4"/>
+    <p:sldId id="259" r:id="rId5"/>
+    <p:sldId id="261" r:id="rId6"/>
+    <p:sldId id="257" r:id="rId7"/>
+    <p:sldId id="264" r:id="rId8"/>
+    <p:sldId id="263" r:id="rId9"/>
+    <p:sldId id="258" r:id="rId10"/>
   </p:sldIdLst>
   <p:sldSz cx="12192000" cy="6858000"/>
   <p:notesSz cx="6858000" cy="9144000"/>
@@ -106,7 +115,445 @@
       </a:defRPr>
     </a:lvl9pPr>
   </p:defaultTextStyle>
+  <p:extLst>
+    <p:ext uri="{EFAFB233-063F-42B5-8137-9DF3F51BA10A}">
+      <p15:sldGuideLst xmlns:p15="http://schemas.microsoft.com/office/powerpoint/2012/main"/>
+    </p:ext>
+  </p:extLst>
 </p:presentation>
+</file>
+
+<file path=ppt/notesMasters/notesMaster1.xml><?xml version="1.0" encoding="utf-8"?>
+<p:notesMaster xmlns:a="http://schemas.openxmlformats.org/drawingml/2006/main" xmlns:r="http://schemas.openxmlformats.org/officeDocument/2006/relationships" xmlns:p="http://schemas.openxmlformats.org/presentationml/2006/main">
+  <p:cSld>
+    <p:bg>
+      <p:bgRef idx="1001">
+        <a:schemeClr val="bg1"/>
+      </p:bgRef>
+    </p:bg>
+    <p:spTree>
+      <p:nvGrpSpPr>
+        <p:cNvPr id="1" name=""/>
+        <p:cNvGrpSpPr/>
+        <p:nvPr/>
+      </p:nvGrpSpPr>
+      <p:grpSpPr>
+        <a:xfrm>
+          <a:off x="0" y="0"/>
+          <a:ext cx="0" cy="0"/>
+          <a:chOff x="0" y="0"/>
+          <a:chExt cx="0" cy="0"/>
+        </a:xfrm>
+      </p:grpSpPr>
+      <p:sp>
+        <p:nvSpPr>
+          <p:cNvPr id="2" name="Header Placeholder 1"/>
+          <p:cNvSpPr>
+            <a:spLocks noGrp="1"/>
+          </p:cNvSpPr>
+          <p:nvPr>
+            <p:ph type="hdr" sz="quarter"/>
+          </p:nvPr>
+        </p:nvSpPr>
+        <p:spPr>
+          <a:xfrm>
+            <a:off x="0" y="0"/>
+            <a:ext cx="2971800" cy="458788"/>
+          </a:xfrm>
+          <a:prstGeom prst="rect">
+            <a:avLst/>
+          </a:prstGeom>
+        </p:spPr>
+        <p:txBody>
+          <a:bodyPr vert="horz" lIns="91440" tIns="45720" rIns="91440" bIns="45720" rtlCol="0"/>
+          <a:lstStyle>
+            <a:lvl1pPr algn="l">
+              <a:defRPr sz="1200"/>
+            </a:lvl1pPr>
+          </a:lstStyle>
+          <a:p>
+            <a:endParaRPr lang="en-US"/>
+          </a:p>
+        </p:txBody>
+      </p:sp>
+      <p:sp>
+        <p:nvSpPr>
+          <p:cNvPr id="3" name="Date Placeholder 2"/>
+          <p:cNvSpPr>
+            <a:spLocks noGrp="1"/>
+          </p:cNvSpPr>
+          <p:nvPr>
+            <p:ph type="dt" idx="1"/>
+          </p:nvPr>
+        </p:nvSpPr>
+        <p:spPr>
+          <a:xfrm>
+            <a:off x="3884613" y="0"/>
+            <a:ext cx="2971800" cy="458788"/>
+          </a:xfrm>
+          <a:prstGeom prst="rect">
+            <a:avLst/>
+          </a:prstGeom>
+        </p:spPr>
+        <p:txBody>
+          <a:bodyPr vert="horz" lIns="91440" tIns="45720" rIns="91440" bIns="45720" rtlCol="0"/>
+          <a:lstStyle>
+            <a:lvl1pPr algn="r">
+              <a:defRPr sz="1200"/>
+            </a:lvl1pPr>
+          </a:lstStyle>
+          <a:p>
+            <a:fld id="{2C987663-479F-4D09-8275-FA43DB256282}" type="datetimeFigureOut">
+              <a:rPr lang="en-US" smtClean="0"/>
+              <a:t>01-Nov-24</a:t>
+            </a:fld>
+            <a:endParaRPr lang="en-US"/>
+          </a:p>
+        </p:txBody>
+      </p:sp>
+      <p:sp>
+        <p:nvSpPr>
+          <p:cNvPr id="4" name="Slide Image Placeholder 3"/>
+          <p:cNvSpPr>
+            <a:spLocks noGrp="1" noRot="1" noChangeAspect="1"/>
+          </p:cNvSpPr>
+          <p:nvPr>
+            <p:ph type="sldImg" idx="2"/>
+          </p:nvPr>
+        </p:nvSpPr>
+        <p:spPr>
+          <a:xfrm>
+            <a:off x="685800" y="1143000"/>
+            <a:ext cx="5486400" cy="3086100"/>
+          </a:xfrm>
+          <a:prstGeom prst="rect">
+            <a:avLst/>
+          </a:prstGeom>
+          <a:noFill/>
+          <a:ln w="12700">
+            <a:solidFill>
+              <a:prstClr val="black"/>
+            </a:solidFill>
+          </a:ln>
+        </p:spPr>
+        <p:txBody>
+          <a:bodyPr vert="horz" lIns="91440" tIns="45720" rIns="91440" bIns="45720" rtlCol="0" anchor="ctr"/>
+          <a:lstStyle/>
+          <a:p>
+            <a:endParaRPr lang="en-US"/>
+          </a:p>
+        </p:txBody>
+      </p:sp>
+      <p:sp>
+        <p:nvSpPr>
+          <p:cNvPr id="5" name="Notes Placeholder 4"/>
+          <p:cNvSpPr>
+            <a:spLocks noGrp="1"/>
+          </p:cNvSpPr>
+          <p:nvPr>
+            <p:ph type="body" sz="quarter" idx="3"/>
+          </p:nvPr>
+        </p:nvSpPr>
+        <p:spPr>
+          <a:xfrm>
+            <a:off x="685800" y="4400550"/>
+            <a:ext cx="5486400" cy="3600450"/>
+          </a:xfrm>
+          <a:prstGeom prst="rect">
+            <a:avLst/>
+          </a:prstGeom>
+        </p:spPr>
+        <p:txBody>
+          <a:bodyPr vert="horz" lIns="91440" tIns="45720" rIns="91440" bIns="45720" rtlCol="0"/>
+          <a:lstStyle/>
+          <a:p>
+            <a:pPr lvl="0"/>
+            <a:r>
+              <a:rPr lang="en-US"/>
+              <a:t>Click to edit Master text styles</a:t>
+            </a:r>
+          </a:p>
+          <a:p>
+            <a:pPr lvl="1"/>
+            <a:r>
+              <a:rPr lang="en-US"/>
+              <a:t>Second level</a:t>
+            </a:r>
+          </a:p>
+          <a:p>
+            <a:pPr lvl="2"/>
+            <a:r>
+              <a:rPr lang="en-US"/>
+              <a:t>Third level</a:t>
+            </a:r>
+          </a:p>
+          <a:p>
+            <a:pPr lvl="3"/>
+            <a:r>
+              <a:rPr lang="en-US"/>
+              <a:t>Fourth level</a:t>
+            </a:r>
+          </a:p>
+          <a:p>
+            <a:pPr lvl="4"/>
+            <a:r>
+              <a:rPr lang="en-US"/>
+              <a:t>Fifth level</a:t>
+            </a:r>
+          </a:p>
+        </p:txBody>
+      </p:sp>
+      <p:sp>
+        <p:nvSpPr>
+          <p:cNvPr id="6" name="Footer Placeholder 5"/>
+          <p:cNvSpPr>
+            <a:spLocks noGrp="1"/>
+          </p:cNvSpPr>
+          <p:nvPr>
+            <p:ph type="ftr" sz="quarter" idx="4"/>
+          </p:nvPr>
+        </p:nvSpPr>
+        <p:spPr>
+          <a:xfrm>
+            <a:off x="0" y="8685213"/>
+            <a:ext cx="2971800" cy="458787"/>
+          </a:xfrm>
+          <a:prstGeom prst="rect">
+            <a:avLst/>
+          </a:prstGeom>
+        </p:spPr>
+        <p:txBody>
+          <a:bodyPr vert="horz" lIns="91440" tIns="45720" rIns="91440" bIns="45720" rtlCol="0" anchor="b"/>
+          <a:lstStyle>
+            <a:lvl1pPr algn="l">
+              <a:defRPr sz="1200"/>
+            </a:lvl1pPr>
+          </a:lstStyle>
+          <a:p>
+            <a:endParaRPr lang="en-US"/>
+          </a:p>
+        </p:txBody>
+      </p:sp>
+      <p:sp>
+        <p:nvSpPr>
+          <p:cNvPr id="7" name="Slide Number Placeholder 6"/>
+          <p:cNvSpPr>
+            <a:spLocks noGrp="1"/>
+          </p:cNvSpPr>
+          <p:nvPr>
+            <p:ph type="sldNum" sz="quarter" idx="5"/>
+          </p:nvPr>
+        </p:nvSpPr>
+        <p:spPr>
+          <a:xfrm>
+            <a:off x="3884613" y="8685213"/>
+            <a:ext cx="2971800" cy="458787"/>
+          </a:xfrm>
+          <a:prstGeom prst="rect">
+            <a:avLst/>
+          </a:prstGeom>
+        </p:spPr>
+        <p:txBody>
+          <a:bodyPr vert="horz" lIns="91440" tIns="45720" rIns="91440" bIns="45720" rtlCol="0" anchor="b"/>
+          <a:lstStyle>
+            <a:lvl1pPr algn="r">
+              <a:defRPr sz="1200"/>
+            </a:lvl1pPr>
+          </a:lstStyle>
+          <a:p>
+            <a:fld id="{0127424B-7579-4C2C-B004-84317CBC7A91}" type="slidenum">
+              <a:rPr lang="en-US" smtClean="0"/>
+              <a:t>‹#›</a:t>
+            </a:fld>
+            <a:endParaRPr lang="en-US"/>
+          </a:p>
+        </p:txBody>
+      </p:sp>
+    </p:spTree>
+    <p:extLst>
+      <p:ext uri="{BB962C8B-B14F-4D97-AF65-F5344CB8AC3E}">
+        <p14:creationId xmlns:p14="http://schemas.microsoft.com/office/powerpoint/2010/main" val="2538782800"/>
+      </p:ext>
+    </p:extLst>
+  </p:cSld>
+  <p:clrMap bg1="lt1" tx1="dk1" bg2="lt2" tx2="dk2" accent1="accent1" accent2="accent2" accent3="accent3" accent4="accent4" accent5="accent5" accent6="accent6" hlink="hlink" folHlink="folHlink"/>
+  <p:notesStyle>
+    <a:lvl1pPr marL="0" algn="l" defTabSz="914400" rtl="0" eaLnBrk="1" latinLnBrk="0" hangingPunct="1">
+      <a:defRPr sz="1200" kern="1200">
+        <a:solidFill>
+          <a:schemeClr val="tx1"/>
+        </a:solidFill>
+        <a:latin typeface="+mn-lt"/>
+        <a:ea typeface="+mn-ea"/>
+        <a:cs typeface="+mn-cs"/>
+      </a:defRPr>
+    </a:lvl1pPr>
+    <a:lvl2pPr marL="457200" algn="l" defTabSz="914400" rtl="0" eaLnBrk="1" latinLnBrk="0" hangingPunct="1">
+      <a:defRPr sz="1200" kern="1200">
+        <a:solidFill>
+          <a:schemeClr val="tx1"/>
+        </a:solidFill>
+        <a:latin typeface="+mn-lt"/>
+        <a:ea typeface="+mn-ea"/>
+        <a:cs typeface="+mn-cs"/>
+      </a:defRPr>
+    </a:lvl2pPr>
+    <a:lvl3pPr marL="914400" algn="l" defTabSz="914400" rtl="0" eaLnBrk="1" latinLnBrk="0" hangingPunct="1">
+      <a:defRPr sz="1200" kern="1200">
+        <a:solidFill>
+          <a:schemeClr val="tx1"/>
+        </a:solidFill>
+        <a:latin typeface="+mn-lt"/>
+        <a:ea typeface="+mn-ea"/>
+        <a:cs typeface="+mn-cs"/>
+      </a:defRPr>
+    </a:lvl3pPr>
+    <a:lvl4pPr marL="1371600" algn="l" defTabSz="914400" rtl="0" eaLnBrk="1" latinLnBrk="0" hangingPunct="1">
+      <a:defRPr sz="1200" kern="1200">
+        <a:solidFill>
+          <a:schemeClr val="tx1"/>
+        </a:solidFill>
+        <a:latin typeface="+mn-lt"/>
+        <a:ea typeface="+mn-ea"/>
+        <a:cs typeface="+mn-cs"/>
+      </a:defRPr>
+    </a:lvl4pPr>
+    <a:lvl5pPr marL="1828800" algn="l" defTabSz="914400" rtl="0" eaLnBrk="1" latinLnBrk="0" hangingPunct="1">
+      <a:defRPr sz="1200" kern="1200">
+        <a:solidFill>
+          <a:schemeClr val="tx1"/>
+        </a:solidFill>
+        <a:latin typeface="+mn-lt"/>
+        <a:ea typeface="+mn-ea"/>
+        <a:cs typeface="+mn-cs"/>
+      </a:defRPr>
+    </a:lvl5pPr>
+    <a:lvl6pPr marL="2286000" algn="l" defTabSz="914400" rtl="0" eaLnBrk="1" latinLnBrk="0" hangingPunct="1">
+      <a:defRPr sz="1200" kern="1200">
+        <a:solidFill>
+          <a:schemeClr val="tx1"/>
+        </a:solidFill>
+        <a:latin typeface="+mn-lt"/>
+        <a:ea typeface="+mn-ea"/>
+        <a:cs typeface="+mn-cs"/>
+      </a:defRPr>
+    </a:lvl6pPr>
+    <a:lvl7pPr marL="2743200" algn="l" defTabSz="914400" rtl="0" eaLnBrk="1" latinLnBrk="0" hangingPunct="1">
+      <a:defRPr sz="1200" kern="1200">
+        <a:solidFill>
+          <a:schemeClr val="tx1"/>
+        </a:solidFill>
+        <a:latin typeface="+mn-lt"/>
+        <a:ea typeface="+mn-ea"/>
+        <a:cs typeface="+mn-cs"/>
+      </a:defRPr>
+    </a:lvl7pPr>
+    <a:lvl8pPr marL="3200400" algn="l" defTabSz="914400" rtl="0" eaLnBrk="1" latinLnBrk="0" hangingPunct="1">
+      <a:defRPr sz="1200" kern="1200">
+        <a:solidFill>
+          <a:schemeClr val="tx1"/>
+        </a:solidFill>
+        <a:latin typeface="+mn-lt"/>
+        <a:ea typeface="+mn-ea"/>
+        <a:cs typeface="+mn-cs"/>
+      </a:defRPr>
+    </a:lvl8pPr>
+    <a:lvl9pPr marL="3657600" algn="l" defTabSz="914400" rtl="0" eaLnBrk="1" latinLnBrk="0" hangingPunct="1">
+      <a:defRPr sz="1200" kern="1200">
+        <a:solidFill>
+          <a:schemeClr val="tx1"/>
+        </a:solidFill>
+        <a:latin typeface="+mn-lt"/>
+        <a:ea typeface="+mn-ea"/>
+        <a:cs typeface="+mn-cs"/>
+      </a:defRPr>
+    </a:lvl9pPr>
+  </p:notesStyle>
+</p:notesMaster>
+</file>
+
+<file path=ppt/notesSlides/notesSlide1.xml><?xml version="1.0" encoding="utf-8"?>
+<p:notes xmlns:a="http://schemas.openxmlformats.org/drawingml/2006/main" xmlns:r="http://schemas.openxmlformats.org/officeDocument/2006/relationships" xmlns:p="http://schemas.openxmlformats.org/presentationml/2006/main">
+  <p:cSld>
+    <p:spTree>
+      <p:nvGrpSpPr>
+        <p:cNvPr id="1" name=""/>
+        <p:cNvGrpSpPr/>
+        <p:nvPr/>
+      </p:nvGrpSpPr>
+      <p:grpSpPr>
+        <a:xfrm>
+          <a:off x="0" y="0"/>
+          <a:ext cx="0" cy="0"/>
+          <a:chOff x="0" y="0"/>
+          <a:chExt cx="0" cy="0"/>
+        </a:xfrm>
+      </p:grpSpPr>
+      <p:sp>
+        <p:nvSpPr>
+          <p:cNvPr id="2" name="Slide Image Placeholder 1"/>
+          <p:cNvSpPr>
+            <a:spLocks noGrp="1" noRot="1" noChangeAspect="1"/>
+          </p:cNvSpPr>
+          <p:nvPr>
+            <p:ph type="sldImg"/>
+          </p:nvPr>
+        </p:nvSpPr>
+        <p:spPr/>
+      </p:sp>
+      <p:sp>
+        <p:nvSpPr>
+          <p:cNvPr id="3" name="Notes Placeholder 2"/>
+          <p:cNvSpPr>
+            <a:spLocks noGrp="1"/>
+          </p:cNvSpPr>
+          <p:nvPr>
+            <p:ph type="body" idx="1"/>
+          </p:nvPr>
+        </p:nvSpPr>
+        <p:spPr/>
+        <p:txBody>
+          <a:bodyPr/>
+          <a:lstStyle/>
+          <a:p>
+            <a:endParaRPr lang="en-US" dirty="0"/>
+          </a:p>
+        </p:txBody>
+      </p:sp>
+      <p:sp>
+        <p:nvSpPr>
+          <p:cNvPr id="4" name="Slide Number Placeholder 3"/>
+          <p:cNvSpPr>
+            <a:spLocks noGrp="1"/>
+          </p:cNvSpPr>
+          <p:nvPr>
+            <p:ph type="sldNum" sz="quarter" idx="5"/>
+          </p:nvPr>
+        </p:nvSpPr>
+        <p:spPr/>
+        <p:txBody>
+          <a:bodyPr/>
+          <a:lstStyle/>
+          <a:p>
+            <a:fld id="{0127424B-7579-4C2C-B004-84317CBC7A91}" type="slidenum">
+              <a:rPr lang="en-US" smtClean="0"/>
+              <a:t>8</a:t>
+            </a:fld>
+            <a:endParaRPr lang="en-US"/>
+          </a:p>
+        </p:txBody>
+      </p:sp>
+    </p:spTree>
+    <p:extLst>
+      <p:ext uri="{BB962C8B-B14F-4D97-AF65-F5344CB8AC3E}">
+        <p14:creationId xmlns:p14="http://schemas.microsoft.com/office/powerpoint/2010/main" val="1922310471"/>
+      </p:ext>
+    </p:extLst>
+  </p:cSld>
+  <p:clrMapOvr>
+    <a:masterClrMapping/>
+  </p:clrMapOvr>
+</p:notes>
 </file>
 
 <file path=ppt/slideLayouts/slideLayout1.xml><?xml version="1.0" encoding="utf-8"?>
@@ -256,7 +703,7 @@
           <a:p>
             <a:fld id="{F9FC4752-2A4D-4348-A7CA-06E7EBB6C313}" type="datetimeFigureOut">
               <a:rPr lang="en-US" smtClean="0"/>
-              <a:t>30-Oct-24</a:t>
+              <a:t>01-Nov-24</a:t>
             </a:fld>
             <a:endParaRPr lang="en-US"/>
           </a:p>
@@ -454,7 +901,7 @@
           <a:p>
             <a:fld id="{F9FC4752-2A4D-4348-A7CA-06E7EBB6C313}" type="datetimeFigureOut">
               <a:rPr lang="en-US" smtClean="0"/>
-              <a:t>30-Oct-24</a:t>
+              <a:t>01-Nov-24</a:t>
             </a:fld>
             <a:endParaRPr lang="en-US"/>
           </a:p>
@@ -662,7 +1109,7 @@
           <a:p>
             <a:fld id="{F9FC4752-2A4D-4348-A7CA-06E7EBB6C313}" type="datetimeFigureOut">
               <a:rPr lang="en-US" smtClean="0"/>
-              <a:t>30-Oct-24</a:t>
+              <a:t>01-Nov-24</a:t>
             </a:fld>
             <a:endParaRPr lang="en-US"/>
           </a:p>
@@ -860,7 +1307,7 @@
           <a:p>
             <a:fld id="{F9FC4752-2A4D-4348-A7CA-06E7EBB6C313}" type="datetimeFigureOut">
               <a:rPr lang="en-US" smtClean="0"/>
-              <a:t>30-Oct-24</a:t>
+              <a:t>01-Nov-24</a:t>
             </a:fld>
             <a:endParaRPr lang="en-US"/>
           </a:p>
@@ -1135,7 +1582,7 @@
           <a:p>
             <a:fld id="{F9FC4752-2A4D-4348-A7CA-06E7EBB6C313}" type="datetimeFigureOut">
               <a:rPr lang="en-US" smtClean="0"/>
-              <a:t>30-Oct-24</a:t>
+              <a:t>01-Nov-24</a:t>
             </a:fld>
             <a:endParaRPr lang="en-US"/>
           </a:p>
@@ -1400,7 +1847,7 @@
           <a:p>
             <a:fld id="{F9FC4752-2A4D-4348-A7CA-06E7EBB6C313}" type="datetimeFigureOut">
               <a:rPr lang="en-US" smtClean="0"/>
-              <a:t>30-Oct-24</a:t>
+              <a:t>01-Nov-24</a:t>
             </a:fld>
             <a:endParaRPr lang="en-US"/>
           </a:p>
@@ -1812,7 +2259,7 @@
           <a:p>
             <a:fld id="{F9FC4752-2A4D-4348-A7CA-06E7EBB6C313}" type="datetimeFigureOut">
               <a:rPr lang="en-US" smtClean="0"/>
-              <a:t>30-Oct-24</a:t>
+              <a:t>01-Nov-24</a:t>
             </a:fld>
             <a:endParaRPr lang="en-US"/>
           </a:p>
@@ -1953,7 +2400,7 @@
           <a:p>
             <a:fld id="{F9FC4752-2A4D-4348-A7CA-06E7EBB6C313}" type="datetimeFigureOut">
               <a:rPr lang="en-US" smtClean="0"/>
-              <a:t>30-Oct-24</a:t>
+              <a:t>01-Nov-24</a:t>
             </a:fld>
             <a:endParaRPr lang="en-US"/>
           </a:p>
@@ -2066,7 +2513,7 @@
           <a:p>
             <a:fld id="{F9FC4752-2A4D-4348-A7CA-06E7EBB6C313}" type="datetimeFigureOut">
               <a:rPr lang="en-US" smtClean="0"/>
-              <a:t>30-Oct-24</a:t>
+              <a:t>01-Nov-24</a:t>
             </a:fld>
             <a:endParaRPr lang="en-US"/>
           </a:p>
@@ -2377,7 +2824,7 @@
           <a:p>
             <a:fld id="{F9FC4752-2A4D-4348-A7CA-06E7EBB6C313}" type="datetimeFigureOut">
               <a:rPr lang="en-US" smtClean="0"/>
-              <a:t>30-Oct-24</a:t>
+              <a:t>01-Nov-24</a:t>
             </a:fld>
             <a:endParaRPr lang="en-US"/>
           </a:p>
@@ -2665,7 +3112,7 @@
           <a:p>
             <a:fld id="{F9FC4752-2A4D-4348-A7CA-06E7EBB6C313}" type="datetimeFigureOut">
               <a:rPr lang="en-US" smtClean="0"/>
-              <a:t>30-Oct-24</a:t>
+              <a:t>01-Nov-24</a:t>
             </a:fld>
             <a:endParaRPr lang="en-US"/>
           </a:p>
@@ -2906,7 +3353,7 @@
           <a:p>
             <a:fld id="{F9FC4752-2A4D-4348-A7CA-06E7EBB6C313}" type="datetimeFigureOut">
               <a:rPr lang="en-US" smtClean="0"/>
-              <a:t>30-Oct-24</a:t>
+              <a:t>01-Nov-24</a:t>
             </a:fld>
             <a:endParaRPr lang="en-US"/>
           </a:p>
@@ -3346,7 +3793,7 @@
           <a:p>
             <a:r>
               <a:rPr lang="en-US" dirty="0"/>
-              <a:t>High Level Design</a:t>
+              <a:t>Project task manager</a:t>
             </a:r>
           </a:p>
         </p:txBody>
@@ -3374,7 +3821,7 @@
           <a:p>
             <a:r>
               <a:rPr lang="en-US" dirty="0"/>
-              <a:t>Task Management Application</a:t>
+              <a:t>High level design</a:t>
             </a:r>
           </a:p>
         </p:txBody>
@@ -3432,7 +3879,7 @@
           <a:p>
             <a:r>
               <a:rPr lang="en-US" dirty="0"/>
-              <a:t>Task Queues</a:t>
+              <a:t>What is a user</a:t>
             </a:r>
           </a:p>
         </p:txBody>
@@ -3460,31 +3907,28 @@
           <a:p>
             <a:r>
               <a:rPr lang="en-US" dirty="0"/>
-              <a:t>Global Queue</a:t>
-            </a:r>
-          </a:p>
-          <a:p>
-            <a:r>
-              <a:rPr lang="en-US" dirty="0"/>
-              <a:t>In progress Queue</a:t>
-            </a:r>
-          </a:p>
-          <a:p>
-            <a:r>
-              <a:rPr lang="en-US" dirty="0"/>
-              <a:t>Removed Queue</a:t>
-            </a:r>
-          </a:p>
-          <a:p>
-            <a:r>
-              <a:rPr lang="en-US" dirty="0"/>
-              <a:t>Completed Queue</a:t>
-            </a:r>
-          </a:p>
-          <a:p>
-            <a:r>
-              <a:rPr lang="en-US" dirty="0"/>
-              <a:t>User specific Queue</a:t>
+              <a:t>A User contains following information</a:t>
+            </a:r>
+          </a:p>
+          <a:p>
+            <a:pPr lvl="1"/>
+            <a:r>
+              <a:rPr lang="en-US" dirty="0"/>
+              <a:t>User name</a:t>
+            </a:r>
+          </a:p>
+          <a:p>
+            <a:pPr lvl="1"/>
+            <a:r>
+              <a:rPr lang="en-US" dirty="0"/>
+              <a:t>Password</a:t>
+            </a:r>
+          </a:p>
+          <a:p>
+            <a:pPr lvl="1"/>
+            <a:r>
+              <a:rPr lang="en-US" dirty="0"/>
+              <a:t>User’s assignment queue</a:t>
             </a:r>
           </a:p>
         </p:txBody>
@@ -3492,7 +3936,7 @@
     </p:spTree>
     <p:extLst>
       <p:ext uri="{BB962C8B-B14F-4D97-AF65-F5344CB8AC3E}">
-        <p14:creationId xmlns:p14="http://schemas.microsoft.com/office/powerpoint/2010/main" val="3174094309"/>
+        <p14:creationId xmlns:p14="http://schemas.microsoft.com/office/powerpoint/2010/main" val="4129203159"/>
       </p:ext>
     </p:extLst>
   </p:cSld>
@@ -3542,7 +3986,7 @@
           <a:p>
             <a:r>
               <a:rPr lang="en-US" dirty="0"/>
-              <a:t>To develop</a:t>
+              <a:t>What can a user do?</a:t>
             </a:r>
           </a:p>
         </p:txBody>
@@ -3570,26 +4014,782 @@
           <a:p>
             <a:r>
               <a:rPr lang="en-US" dirty="0"/>
-              <a:t>Queue reordering based on priority</a:t>
-            </a:r>
-          </a:p>
-          <a:p>
-            <a:r>
-              <a:rPr lang="en-US" dirty="0"/>
-              <a:t>Convert all queues to priority queues</a:t>
-            </a:r>
-          </a:p>
-          <a:p>
-            <a:r>
-              <a:rPr lang="en-US" dirty="0"/>
-              <a:t>Global complete/remove regardless of queue position</a:t>
+              <a:t>A User contains following information</a:t>
             </a:r>
           </a:p>
           <a:p>
             <a:pPr lvl="1"/>
             <a:r>
               <a:rPr lang="en-US" dirty="0"/>
-              <a:t>Current behavior: can only complete/remove on top position</a:t>
+              <a:t>Register themselves</a:t>
+            </a:r>
+          </a:p>
+          <a:p>
+            <a:pPr lvl="1"/>
+            <a:r>
+              <a:rPr lang="en-US" dirty="0"/>
+              <a:t>Create tasks</a:t>
+            </a:r>
+          </a:p>
+          <a:p>
+            <a:pPr lvl="1"/>
+            <a:r>
+              <a:rPr lang="en-US" dirty="0"/>
+              <a:t>Login to their account</a:t>
+            </a:r>
+          </a:p>
+          <a:p>
+            <a:pPr lvl="1"/>
+            <a:r>
+              <a:rPr lang="en-US" dirty="0"/>
+              <a:t>Take a look at their assigned tasks (login required)</a:t>
+            </a:r>
+          </a:p>
+          <a:p>
+            <a:pPr lvl="1"/>
+            <a:r>
+              <a:rPr lang="en-US" dirty="0"/>
+              <a:t>Take action on their assigned tasks (login required)</a:t>
+            </a:r>
+          </a:p>
+          <a:p>
+            <a:pPr lvl="2"/>
+            <a:r>
+              <a:rPr lang="en-US" dirty="0"/>
+              <a:t>mark them completed</a:t>
+            </a:r>
+          </a:p>
+          <a:p>
+            <a:pPr lvl="2"/>
+            <a:r>
+              <a:rPr lang="en-US" dirty="0"/>
+              <a:t>mark them removed</a:t>
+            </a:r>
+          </a:p>
+          <a:p>
+            <a:pPr lvl="2"/>
+            <a:r>
+              <a:rPr lang="en-US" dirty="0"/>
+              <a:t>unassign themselves from the task</a:t>
+            </a:r>
+          </a:p>
+          <a:p>
+            <a:pPr lvl="2"/>
+            <a:r>
+              <a:rPr lang="en-US" dirty="0"/>
+              <a:t>reassign the task to another user</a:t>
+            </a:r>
+          </a:p>
+        </p:txBody>
+      </p:sp>
+    </p:spTree>
+    <p:extLst>
+      <p:ext uri="{BB962C8B-B14F-4D97-AF65-F5344CB8AC3E}">
+        <p14:creationId xmlns:p14="http://schemas.microsoft.com/office/powerpoint/2010/main" val="425787345"/>
+      </p:ext>
+    </p:extLst>
+  </p:cSld>
+  <p:clrMapOvr>
+    <a:masterClrMapping/>
+  </p:clrMapOvr>
+</p:sld>
+</file>
+
+<file path=ppt/slides/slide4.xml><?xml version="1.0" encoding="utf-8"?>
+<p:sld xmlns:a="http://schemas.openxmlformats.org/drawingml/2006/main" xmlns:r="http://schemas.openxmlformats.org/officeDocument/2006/relationships" xmlns:p="http://schemas.openxmlformats.org/presentationml/2006/main">
+  <p:cSld>
+    <p:spTree>
+      <p:nvGrpSpPr>
+        <p:cNvPr id="1" name=""/>
+        <p:cNvGrpSpPr/>
+        <p:nvPr/>
+      </p:nvGrpSpPr>
+      <p:grpSpPr>
+        <a:xfrm>
+          <a:off x="0" y="0"/>
+          <a:ext cx="0" cy="0"/>
+          <a:chOff x="0" y="0"/>
+          <a:chExt cx="0" cy="0"/>
+        </a:xfrm>
+      </p:grpSpPr>
+      <p:sp>
+        <p:nvSpPr>
+          <p:cNvPr id="2" name="Title 1">
+            <a:extLst>
+              <a:ext uri="{FF2B5EF4-FFF2-40B4-BE49-F238E27FC236}">
+                <a16:creationId xmlns:a16="http://schemas.microsoft.com/office/drawing/2014/main" id="{20AB3A41-8B53-4FE4-C59F-64D67745511F}"/>
+              </a:ext>
+            </a:extLst>
+          </p:cNvPr>
+          <p:cNvSpPr>
+            <a:spLocks noGrp="1"/>
+          </p:cNvSpPr>
+          <p:nvPr>
+            <p:ph type="title"/>
+          </p:nvPr>
+        </p:nvSpPr>
+        <p:spPr/>
+        <p:txBody>
+          <a:bodyPr/>
+          <a:lstStyle/>
+          <a:p>
+            <a:r>
+              <a:rPr lang="en-US" dirty="0"/>
+              <a:t>What is a task</a:t>
+            </a:r>
+          </a:p>
+        </p:txBody>
+      </p:sp>
+      <p:sp>
+        <p:nvSpPr>
+          <p:cNvPr id="3" name="Content Placeholder 2">
+            <a:extLst>
+              <a:ext uri="{FF2B5EF4-FFF2-40B4-BE49-F238E27FC236}">
+                <a16:creationId xmlns:a16="http://schemas.microsoft.com/office/drawing/2014/main" id="{B188AECD-C15F-A712-B8DC-15FDA0FDEC15}"/>
+              </a:ext>
+            </a:extLst>
+          </p:cNvPr>
+          <p:cNvSpPr>
+            <a:spLocks noGrp="1"/>
+          </p:cNvSpPr>
+          <p:nvPr>
+            <p:ph idx="1"/>
+          </p:nvPr>
+        </p:nvSpPr>
+        <p:spPr/>
+        <p:txBody>
+          <a:bodyPr/>
+          <a:lstStyle/>
+          <a:p>
+            <a:r>
+              <a:rPr lang="en-US" dirty="0"/>
+              <a:t>A Task contains following information</a:t>
+            </a:r>
+          </a:p>
+          <a:p>
+            <a:pPr lvl="1"/>
+            <a:r>
+              <a:rPr lang="en-US" dirty="0"/>
+              <a:t>Task id</a:t>
+            </a:r>
+          </a:p>
+          <a:p>
+            <a:pPr lvl="1"/>
+            <a:r>
+              <a:rPr lang="en-US" dirty="0"/>
+              <a:t>Status</a:t>
+            </a:r>
+          </a:p>
+          <a:p>
+            <a:pPr lvl="1"/>
+            <a:r>
+              <a:rPr lang="en-US" dirty="0"/>
+              <a:t>Title</a:t>
+            </a:r>
+          </a:p>
+          <a:p>
+            <a:pPr lvl="1"/>
+            <a:r>
+              <a:rPr lang="en-US" dirty="0"/>
+              <a:t>Assignee</a:t>
+            </a:r>
+          </a:p>
+          <a:p>
+            <a:pPr lvl="1"/>
+            <a:r>
+              <a:rPr lang="en-US" dirty="0"/>
+              <a:t>Target date</a:t>
+            </a:r>
+          </a:p>
+          <a:p>
+            <a:pPr lvl="1"/>
+            <a:r>
+              <a:rPr lang="en-US" dirty="0"/>
+              <a:t>priority</a:t>
+            </a:r>
+          </a:p>
+        </p:txBody>
+      </p:sp>
+    </p:spTree>
+    <p:extLst>
+      <p:ext uri="{BB962C8B-B14F-4D97-AF65-F5344CB8AC3E}">
+        <p14:creationId xmlns:p14="http://schemas.microsoft.com/office/powerpoint/2010/main" val="4080821268"/>
+      </p:ext>
+    </p:extLst>
+  </p:cSld>
+  <p:clrMapOvr>
+    <a:masterClrMapping/>
+  </p:clrMapOvr>
+</p:sld>
+</file>
+
+<file path=ppt/slides/slide5.xml><?xml version="1.0" encoding="utf-8"?>
+<p:sld xmlns:a="http://schemas.openxmlformats.org/drawingml/2006/main" xmlns:r="http://schemas.openxmlformats.org/officeDocument/2006/relationships" xmlns:p="http://schemas.openxmlformats.org/presentationml/2006/main">
+  <p:cSld>
+    <p:spTree>
+      <p:nvGrpSpPr>
+        <p:cNvPr id="1" name=""/>
+        <p:cNvGrpSpPr/>
+        <p:nvPr/>
+      </p:nvGrpSpPr>
+      <p:grpSpPr>
+        <a:xfrm>
+          <a:off x="0" y="0"/>
+          <a:ext cx="0" cy="0"/>
+          <a:chOff x="0" y="0"/>
+          <a:chExt cx="0" cy="0"/>
+        </a:xfrm>
+      </p:grpSpPr>
+      <p:sp>
+        <p:nvSpPr>
+          <p:cNvPr id="2" name="Title 1">
+            <a:extLst>
+              <a:ext uri="{FF2B5EF4-FFF2-40B4-BE49-F238E27FC236}">
+                <a16:creationId xmlns:a16="http://schemas.microsoft.com/office/drawing/2014/main" id="{20AB3A41-8B53-4FE4-C59F-64D67745511F}"/>
+              </a:ext>
+            </a:extLst>
+          </p:cNvPr>
+          <p:cNvSpPr>
+            <a:spLocks noGrp="1"/>
+          </p:cNvSpPr>
+          <p:nvPr>
+            <p:ph type="title"/>
+          </p:nvPr>
+        </p:nvSpPr>
+        <p:spPr/>
+        <p:txBody>
+          <a:bodyPr/>
+          <a:lstStyle/>
+          <a:p>
+            <a:r>
+              <a:rPr lang="en-US" dirty="0"/>
+              <a:t>What is a Queue</a:t>
+            </a:r>
+          </a:p>
+        </p:txBody>
+      </p:sp>
+      <p:sp>
+        <p:nvSpPr>
+          <p:cNvPr id="3" name="Content Placeholder 2">
+            <a:extLst>
+              <a:ext uri="{FF2B5EF4-FFF2-40B4-BE49-F238E27FC236}">
+                <a16:creationId xmlns:a16="http://schemas.microsoft.com/office/drawing/2014/main" id="{B188AECD-C15F-A712-B8DC-15FDA0FDEC15}"/>
+              </a:ext>
+            </a:extLst>
+          </p:cNvPr>
+          <p:cNvSpPr>
+            <a:spLocks noGrp="1"/>
+          </p:cNvSpPr>
+          <p:nvPr>
+            <p:ph idx="1"/>
+          </p:nvPr>
+        </p:nvSpPr>
+        <p:spPr/>
+        <p:txBody>
+          <a:bodyPr/>
+          <a:lstStyle/>
+          <a:p>
+            <a:r>
+              <a:rPr lang="en-US" dirty="0"/>
+              <a:t>A queue is an entity that contains an </a:t>
+            </a:r>
+            <a:r>
+              <a:rPr lang="en-US" dirty="0" err="1"/>
+              <a:t>arraylist</a:t>
+            </a:r>
+            <a:r>
+              <a:rPr lang="en-US" dirty="0"/>
+              <a:t> of tasks along with methods to operate on the said </a:t>
+            </a:r>
+            <a:r>
+              <a:rPr lang="en-US" dirty="0" err="1"/>
+              <a:t>arraylist</a:t>
+            </a:r>
+            <a:r>
+              <a:rPr lang="en-US" dirty="0"/>
+              <a:t>.</a:t>
+            </a:r>
+          </a:p>
+          <a:p>
+            <a:r>
+              <a:rPr lang="en-US" dirty="0"/>
+              <a:t>Each task can be tracked by multiple queues at the same time.</a:t>
+            </a:r>
+          </a:p>
+          <a:p>
+            <a:r>
+              <a:rPr lang="en-US" dirty="0"/>
+              <a:t>Users can</a:t>
+            </a:r>
+          </a:p>
+          <a:p>
+            <a:pPr lvl="1"/>
+            <a:r>
+              <a:rPr lang="en-US" dirty="0"/>
+              <a:t>Get top task – O(n)</a:t>
+            </a:r>
+          </a:p>
+          <a:p>
+            <a:pPr lvl="1"/>
+            <a:r>
+              <a:rPr lang="en-US" dirty="0"/>
+              <a:t>Enqueue – O(n)</a:t>
+            </a:r>
+          </a:p>
+          <a:p>
+            <a:pPr lvl="1"/>
+            <a:r>
+              <a:rPr lang="en-US" dirty="0"/>
+              <a:t>Dequeue – O(1)</a:t>
+            </a:r>
+          </a:p>
+          <a:p>
+            <a:pPr lvl="1"/>
+            <a:r>
+              <a:rPr lang="en-US" dirty="0"/>
+              <a:t>Print all tasks in the queue – O(n)</a:t>
+            </a:r>
+          </a:p>
+          <a:p>
+            <a:pPr lvl="1"/>
+            <a:r>
+              <a:rPr lang="en-US" dirty="0"/>
+              <a:t>Find a specific task in a specific queue or a global queue – O(n)</a:t>
+            </a:r>
+          </a:p>
+          <a:p>
+            <a:pPr lvl="1"/>
+            <a:endParaRPr lang="en-US" dirty="0"/>
+          </a:p>
+        </p:txBody>
+      </p:sp>
+    </p:spTree>
+    <p:extLst>
+      <p:ext uri="{BB962C8B-B14F-4D97-AF65-F5344CB8AC3E}">
+        <p14:creationId xmlns:p14="http://schemas.microsoft.com/office/powerpoint/2010/main" val="1602082136"/>
+      </p:ext>
+    </p:extLst>
+  </p:cSld>
+  <p:clrMapOvr>
+    <a:masterClrMapping/>
+  </p:clrMapOvr>
+</p:sld>
+</file>
+
+<file path=ppt/slides/slide6.xml><?xml version="1.0" encoding="utf-8"?>
+<p:sld xmlns:a="http://schemas.openxmlformats.org/drawingml/2006/main" xmlns:r="http://schemas.openxmlformats.org/officeDocument/2006/relationships" xmlns:p="http://schemas.openxmlformats.org/presentationml/2006/main">
+  <p:cSld>
+    <p:spTree>
+      <p:nvGrpSpPr>
+        <p:cNvPr id="1" name=""/>
+        <p:cNvGrpSpPr/>
+        <p:nvPr/>
+      </p:nvGrpSpPr>
+      <p:grpSpPr>
+        <a:xfrm>
+          <a:off x="0" y="0"/>
+          <a:ext cx="0" cy="0"/>
+          <a:chOff x="0" y="0"/>
+          <a:chExt cx="0" cy="0"/>
+        </a:xfrm>
+      </p:grpSpPr>
+      <p:sp>
+        <p:nvSpPr>
+          <p:cNvPr id="2" name="Title 1">
+            <a:extLst>
+              <a:ext uri="{FF2B5EF4-FFF2-40B4-BE49-F238E27FC236}">
+                <a16:creationId xmlns:a16="http://schemas.microsoft.com/office/drawing/2014/main" id="{20AB3A41-8B53-4FE4-C59F-64D67745511F}"/>
+              </a:ext>
+            </a:extLst>
+          </p:cNvPr>
+          <p:cNvSpPr>
+            <a:spLocks noGrp="1"/>
+          </p:cNvSpPr>
+          <p:nvPr>
+            <p:ph type="title"/>
+          </p:nvPr>
+        </p:nvSpPr>
+        <p:spPr/>
+        <p:txBody>
+          <a:bodyPr/>
+          <a:lstStyle/>
+          <a:p>
+            <a:r>
+              <a:rPr lang="en-US" dirty="0"/>
+              <a:t>What are the different task Queues</a:t>
+            </a:r>
+          </a:p>
+        </p:txBody>
+      </p:sp>
+      <p:sp>
+        <p:nvSpPr>
+          <p:cNvPr id="3" name="Content Placeholder 2">
+            <a:extLst>
+              <a:ext uri="{FF2B5EF4-FFF2-40B4-BE49-F238E27FC236}">
+                <a16:creationId xmlns:a16="http://schemas.microsoft.com/office/drawing/2014/main" id="{B188AECD-C15F-A712-B8DC-15FDA0FDEC15}"/>
+              </a:ext>
+            </a:extLst>
+          </p:cNvPr>
+          <p:cNvSpPr>
+            <a:spLocks noGrp="1"/>
+          </p:cNvSpPr>
+          <p:nvPr>
+            <p:ph idx="1"/>
+          </p:nvPr>
+        </p:nvSpPr>
+        <p:spPr/>
+        <p:txBody>
+          <a:bodyPr/>
+          <a:lstStyle/>
+          <a:p>
+            <a:r>
+              <a:rPr lang="en-US" dirty="0"/>
+              <a:t>Global Queue – to keep track of every task</a:t>
+            </a:r>
+          </a:p>
+          <a:p>
+            <a:r>
+              <a:rPr lang="en-US" dirty="0"/>
+              <a:t>In progress Queue – to keep track of all new/in progress tasks</a:t>
+            </a:r>
+          </a:p>
+          <a:p>
+            <a:r>
+              <a:rPr lang="en-US" dirty="0"/>
+              <a:t>Removed Queue – to keep track of all removed tasks</a:t>
+            </a:r>
+          </a:p>
+          <a:p>
+            <a:r>
+              <a:rPr lang="en-US" dirty="0"/>
+              <a:t>Completed Queue – to keep track of all completed tasks</a:t>
+            </a:r>
+          </a:p>
+          <a:p>
+            <a:r>
+              <a:rPr lang="en-US" dirty="0"/>
+              <a:t>User specific Queue (1 for each user) – to keep track of all new/in progress tasks assigned to the user</a:t>
+            </a:r>
+          </a:p>
+        </p:txBody>
+      </p:sp>
+    </p:spTree>
+    <p:extLst>
+      <p:ext uri="{BB962C8B-B14F-4D97-AF65-F5344CB8AC3E}">
+        <p14:creationId xmlns:p14="http://schemas.microsoft.com/office/powerpoint/2010/main" val="3174094309"/>
+      </p:ext>
+    </p:extLst>
+  </p:cSld>
+  <p:clrMapOvr>
+    <a:masterClrMapping/>
+  </p:clrMapOvr>
+</p:sld>
+</file>
+
+<file path=ppt/slides/slide7.xml><?xml version="1.0" encoding="utf-8"?>
+<p:sld xmlns:a="http://schemas.openxmlformats.org/drawingml/2006/main" xmlns:r="http://schemas.openxmlformats.org/officeDocument/2006/relationships" xmlns:p="http://schemas.openxmlformats.org/presentationml/2006/main">
+  <p:cSld>
+    <p:spTree>
+      <p:nvGrpSpPr>
+        <p:cNvPr id="1" name=""/>
+        <p:cNvGrpSpPr/>
+        <p:nvPr/>
+      </p:nvGrpSpPr>
+      <p:grpSpPr>
+        <a:xfrm>
+          <a:off x="0" y="0"/>
+          <a:ext cx="0" cy="0"/>
+          <a:chOff x="0" y="0"/>
+          <a:chExt cx="0" cy="0"/>
+        </a:xfrm>
+      </p:grpSpPr>
+      <p:sp>
+        <p:nvSpPr>
+          <p:cNvPr id="2" name="Title 1">
+            <a:extLst>
+              <a:ext uri="{FF2B5EF4-FFF2-40B4-BE49-F238E27FC236}">
+                <a16:creationId xmlns:a16="http://schemas.microsoft.com/office/drawing/2014/main" id="{20AB3A41-8B53-4FE4-C59F-64D67745511F}"/>
+              </a:ext>
+            </a:extLst>
+          </p:cNvPr>
+          <p:cNvSpPr>
+            <a:spLocks noGrp="1"/>
+          </p:cNvSpPr>
+          <p:nvPr>
+            <p:ph type="title"/>
+          </p:nvPr>
+        </p:nvSpPr>
+        <p:spPr/>
+        <p:txBody>
+          <a:bodyPr/>
+          <a:lstStyle/>
+          <a:p>
+            <a:r>
+              <a:rPr lang="en-US" dirty="0"/>
+              <a:t>User experience/interface notes</a:t>
+            </a:r>
+          </a:p>
+        </p:txBody>
+      </p:sp>
+      <p:sp>
+        <p:nvSpPr>
+          <p:cNvPr id="3" name="Content Placeholder 2">
+            <a:extLst>
+              <a:ext uri="{FF2B5EF4-FFF2-40B4-BE49-F238E27FC236}">
+                <a16:creationId xmlns:a16="http://schemas.microsoft.com/office/drawing/2014/main" id="{B188AECD-C15F-A712-B8DC-15FDA0FDEC15}"/>
+              </a:ext>
+            </a:extLst>
+          </p:cNvPr>
+          <p:cNvSpPr>
+            <a:spLocks noGrp="1"/>
+          </p:cNvSpPr>
+          <p:nvPr>
+            <p:ph idx="1"/>
+          </p:nvPr>
+        </p:nvSpPr>
+        <p:spPr/>
+        <p:txBody>
+          <a:bodyPr/>
+          <a:lstStyle/>
+          <a:p>
+            <a:r>
+              <a:rPr lang="en-US" dirty="0"/>
+              <a:t>Users can navigate through the application via cascading menus (kind of like the IVR systems which we use on phone calls)</a:t>
+            </a:r>
+          </a:p>
+          <a:p>
+            <a:r>
+              <a:rPr lang="en-US" dirty="0"/>
+              <a:t>Users can use letters on keyboard to navigate the menus and provide inputs on the rest of the application.</a:t>
+            </a:r>
+          </a:p>
+          <a:p>
+            <a:r>
+              <a:rPr lang="en-US" dirty="0"/>
+              <a:t>The application is designed to run perpetually until the user chooses to exit by choosing the correct options</a:t>
+            </a:r>
+          </a:p>
+        </p:txBody>
+      </p:sp>
+    </p:spTree>
+    <p:extLst>
+      <p:ext uri="{BB962C8B-B14F-4D97-AF65-F5344CB8AC3E}">
+        <p14:creationId xmlns:p14="http://schemas.microsoft.com/office/powerpoint/2010/main" val="3818831854"/>
+      </p:ext>
+    </p:extLst>
+  </p:cSld>
+  <p:clrMapOvr>
+    <a:masterClrMapping/>
+  </p:clrMapOvr>
+</p:sld>
+</file>
+
+<file path=ppt/slides/slide8.xml><?xml version="1.0" encoding="utf-8"?>
+<p:sld xmlns:a="http://schemas.openxmlformats.org/drawingml/2006/main" xmlns:r="http://schemas.openxmlformats.org/officeDocument/2006/relationships" xmlns:p="http://schemas.openxmlformats.org/presentationml/2006/main">
+  <p:cSld>
+    <p:spTree>
+      <p:nvGrpSpPr>
+        <p:cNvPr id="1" name=""/>
+        <p:cNvGrpSpPr/>
+        <p:nvPr/>
+      </p:nvGrpSpPr>
+      <p:grpSpPr>
+        <a:xfrm>
+          <a:off x="0" y="0"/>
+          <a:ext cx="0" cy="0"/>
+          <a:chOff x="0" y="0"/>
+          <a:chExt cx="0" cy="0"/>
+        </a:xfrm>
+      </p:grpSpPr>
+      <p:sp>
+        <p:nvSpPr>
+          <p:cNvPr id="2" name="Title 1">
+            <a:extLst>
+              <a:ext uri="{FF2B5EF4-FFF2-40B4-BE49-F238E27FC236}">
+                <a16:creationId xmlns:a16="http://schemas.microsoft.com/office/drawing/2014/main" id="{20AB3A41-8B53-4FE4-C59F-64D67745511F}"/>
+              </a:ext>
+            </a:extLst>
+          </p:cNvPr>
+          <p:cNvSpPr>
+            <a:spLocks noGrp="1"/>
+          </p:cNvSpPr>
+          <p:nvPr>
+            <p:ph type="title"/>
+          </p:nvPr>
+        </p:nvSpPr>
+        <p:spPr/>
+        <p:txBody>
+          <a:bodyPr/>
+          <a:lstStyle/>
+          <a:p>
+            <a:r>
+              <a:rPr lang="en-US" dirty="0"/>
+              <a:t>Key implementation notes</a:t>
+            </a:r>
+          </a:p>
+        </p:txBody>
+      </p:sp>
+      <p:sp>
+        <p:nvSpPr>
+          <p:cNvPr id="3" name="Content Placeholder 2">
+            <a:extLst>
+              <a:ext uri="{FF2B5EF4-FFF2-40B4-BE49-F238E27FC236}">
+                <a16:creationId xmlns:a16="http://schemas.microsoft.com/office/drawing/2014/main" id="{B188AECD-C15F-A712-B8DC-15FDA0FDEC15}"/>
+              </a:ext>
+            </a:extLst>
+          </p:cNvPr>
+          <p:cNvSpPr>
+            <a:spLocks noGrp="1"/>
+          </p:cNvSpPr>
+          <p:nvPr>
+            <p:ph idx="1"/>
+          </p:nvPr>
+        </p:nvSpPr>
+        <p:spPr/>
+        <p:txBody>
+          <a:bodyPr>
+            <a:normAutofit fontScale="92500" lnSpcReduction="20000"/>
+          </a:bodyPr>
+          <a:lstStyle/>
+          <a:p>
+            <a:r>
+              <a:rPr lang="en-US" dirty="0"/>
+              <a:t>Usage of </a:t>
+            </a:r>
+            <a:r>
+              <a:rPr lang="en-US" dirty="0" err="1"/>
+              <a:t>Arraylists</a:t>
+            </a:r>
+            <a:r>
+              <a:rPr lang="en-US" dirty="0"/>
+              <a:t> for task queues</a:t>
+            </a:r>
+          </a:p>
+          <a:p>
+            <a:r>
+              <a:rPr lang="en-US" dirty="0"/>
+              <a:t>Usage of </a:t>
+            </a:r>
+            <a:r>
+              <a:rPr lang="en-US" dirty="0" err="1"/>
+              <a:t>Hashmap</a:t>
+            </a:r>
+            <a:r>
+              <a:rPr lang="en-US" dirty="0"/>
+              <a:t> to store a map of all users as a searchable database</a:t>
+            </a:r>
+          </a:p>
+          <a:p>
+            <a:r>
+              <a:rPr lang="en-US" dirty="0"/>
+              <a:t>Usage of String operations and date formatting operations for task details.</a:t>
+            </a:r>
+          </a:p>
+          <a:p>
+            <a:r>
+              <a:rPr lang="en-US" dirty="0"/>
+              <a:t>Usage of a basic self-developed hash function to skip storing actual passwords for added security</a:t>
+            </a:r>
+          </a:p>
+          <a:p>
+            <a:r>
+              <a:rPr lang="en-US" dirty="0"/>
+              <a:t>Most of the possible exceptions are handled in a way that the application is robust and users can keep retrying their actions without the application breaking/stopping.</a:t>
+            </a:r>
+          </a:p>
+          <a:p>
+            <a:r>
+              <a:rPr lang="en-US" dirty="0"/>
+              <a:t>No AI help was taken. Although a lot of learning happened on the fly, all of the code is handwritten.</a:t>
+            </a:r>
+          </a:p>
+          <a:p>
+            <a:endParaRPr lang="en-US" dirty="0"/>
+          </a:p>
+        </p:txBody>
+      </p:sp>
+    </p:spTree>
+    <p:extLst>
+      <p:ext uri="{BB962C8B-B14F-4D97-AF65-F5344CB8AC3E}">
+        <p14:creationId xmlns:p14="http://schemas.microsoft.com/office/powerpoint/2010/main" val="613754538"/>
+      </p:ext>
+    </p:extLst>
+  </p:cSld>
+  <p:clrMapOvr>
+    <a:masterClrMapping/>
+  </p:clrMapOvr>
+</p:sld>
+</file>
+
+<file path=ppt/slides/slide9.xml><?xml version="1.0" encoding="utf-8"?>
+<p:sld xmlns:a="http://schemas.openxmlformats.org/drawingml/2006/main" xmlns:r="http://schemas.openxmlformats.org/officeDocument/2006/relationships" xmlns:p="http://schemas.openxmlformats.org/presentationml/2006/main">
+  <p:cSld>
+    <p:spTree>
+      <p:nvGrpSpPr>
+        <p:cNvPr id="1" name=""/>
+        <p:cNvGrpSpPr/>
+        <p:nvPr/>
+      </p:nvGrpSpPr>
+      <p:grpSpPr>
+        <a:xfrm>
+          <a:off x="0" y="0"/>
+          <a:ext cx="0" cy="0"/>
+          <a:chOff x="0" y="0"/>
+          <a:chExt cx="0" cy="0"/>
+        </a:xfrm>
+      </p:grpSpPr>
+      <p:sp>
+        <p:nvSpPr>
+          <p:cNvPr id="2" name="Title 1">
+            <a:extLst>
+              <a:ext uri="{FF2B5EF4-FFF2-40B4-BE49-F238E27FC236}">
+                <a16:creationId xmlns:a16="http://schemas.microsoft.com/office/drawing/2014/main" id="{20AB3A41-8B53-4FE4-C59F-64D67745511F}"/>
+              </a:ext>
+            </a:extLst>
+          </p:cNvPr>
+          <p:cNvSpPr>
+            <a:spLocks noGrp="1"/>
+          </p:cNvSpPr>
+          <p:nvPr>
+            <p:ph type="title"/>
+          </p:nvPr>
+        </p:nvSpPr>
+        <p:spPr/>
+        <p:txBody>
+          <a:bodyPr/>
+          <a:lstStyle/>
+          <a:p>
+            <a:r>
+              <a:rPr lang="en-US" dirty="0"/>
+              <a:t>Ideas for future updates</a:t>
+            </a:r>
+          </a:p>
+        </p:txBody>
+      </p:sp>
+      <p:sp>
+        <p:nvSpPr>
+          <p:cNvPr id="3" name="Content Placeholder 2">
+            <a:extLst>
+              <a:ext uri="{FF2B5EF4-FFF2-40B4-BE49-F238E27FC236}">
+                <a16:creationId xmlns:a16="http://schemas.microsoft.com/office/drawing/2014/main" id="{B188AECD-C15F-A712-B8DC-15FDA0FDEC15}"/>
+              </a:ext>
+            </a:extLst>
+          </p:cNvPr>
+          <p:cNvSpPr>
+            <a:spLocks noGrp="1"/>
+          </p:cNvSpPr>
+          <p:nvPr>
+            <p:ph idx="1"/>
+          </p:nvPr>
+        </p:nvSpPr>
+        <p:spPr/>
+        <p:txBody>
+          <a:bodyPr/>
+          <a:lstStyle/>
+          <a:p>
+            <a:r>
+              <a:rPr lang="en-US" dirty="0"/>
+              <a:t>Automated/manual queue reordering based on priority/dates</a:t>
             </a:r>
           </a:p>
         </p:txBody>
@@ -3920,4 +5120,319 @@
     </a:ext>
   </a:extLst>
 </a:theme>
+</file>
+
+<file path=ppt/theme/theme2.xml><?xml version="1.0" encoding="utf-8"?>
+<a:theme xmlns:a="http://schemas.openxmlformats.org/drawingml/2006/main" name="Office Theme">
+  <a:themeElements>
+    <a:clrScheme name="Office">
+      <a:dk1>
+        <a:sysClr val="windowText" lastClr="000000"/>
+      </a:dk1>
+      <a:lt1>
+        <a:sysClr val="window" lastClr="FFFFFF"/>
+      </a:lt1>
+      <a:dk2>
+        <a:srgbClr val="0E2841"/>
+      </a:dk2>
+      <a:lt2>
+        <a:srgbClr val="E8E8E8"/>
+      </a:lt2>
+      <a:accent1>
+        <a:srgbClr val="156082"/>
+      </a:accent1>
+      <a:accent2>
+        <a:srgbClr val="E97132"/>
+      </a:accent2>
+      <a:accent3>
+        <a:srgbClr val="196B24"/>
+      </a:accent3>
+      <a:accent4>
+        <a:srgbClr val="0F9ED5"/>
+      </a:accent4>
+      <a:accent5>
+        <a:srgbClr val="A02B93"/>
+      </a:accent5>
+      <a:accent6>
+        <a:srgbClr val="4EA72E"/>
+      </a:accent6>
+      <a:hlink>
+        <a:srgbClr val="467886"/>
+      </a:hlink>
+      <a:folHlink>
+        <a:srgbClr val="96607D"/>
+      </a:folHlink>
+    </a:clrScheme>
+    <a:fontScheme name="Office">
+      <a:majorFont>
+        <a:latin typeface="Aptos Display" panose="02110004020202020204"/>
+        <a:ea typeface=""/>
+        <a:cs typeface=""/>
+        <a:font script="Jpan" typeface="游ゴシック Light"/>
+        <a:font script="Hang" typeface="맑은 고딕"/>
+        <a:font script="Hans" typeface="等线 Light"/>
+        <a:font script="Hant" typeface="新細明體"/>
+        <a:font script="Arab" typeface="Times New Roman"/>
+        <a:font script="Hebr" typeface="Times New Roman"/>
+        <a:font script="Thai" typeface="Angsana New"/>
+        <a:font script="Ethi" typeface="Nyala"/>
+        <a:font script="Beng" typeface="Vrinda"/>
+        <a:font script="Gujr" typeface="Shruti"/>
+        <a:font script="Khmr" typeface="MoolBoran"/>
+        <a:font script="Knda" typeface="Tunga"/>
+        <a:font script="Guru" typeface="Raavi"/>
+        <a:font script="Cans" typeface="Euphemia"/>
+        <a:font script="Cher" typeface="Plantagenet Cherokee"/>
+        <a:font script="Yiii" typeface="Microsoft Yi Baiti"/>
+        <a:font script="Tibt" typeface="Microsoft Himalaya"/>
+        <a:font script="Thaa" typeface="MV Boli"/>
+        <a:font script="Deva" typeface="Mangal"/>
+        <a:font script="Telu" typeface="Gautami"/>
+        <a:font script="Taml" typeface="Latha"/>
+        <a:font script="Syrc" typeface="Estrangelo Edessa"/>
+        <a:font script="Orya" typeface="Kalinga"/>
+        <a:font script="Mlym" typeface="Kartika"/>
+        <a:font script="Laoo" typeface="DokChampa"/>
+        <a:font script="Sinh" typeface="Iskoola Pota"/>
+        <a:font script="Mong" typeface="Mongolian Baiti"/>
+        <a:font script="Viet" typeface="Times New Roman"/>
+        <a:font script="Uigh" typeface="Microsoft Uighur"/>
+        <a:font script="Geor" typeface="Sylfaen"/>
+        <a:font script="Armn" typeface="Arial"/>
+        <a:font script="Bugi" typeface="Leelawadee UI"/>
+        <a:font script="Bopo" typeface="Microsoft JhengHei"/>
+        <a:font script="Java" typeface="Javanese Text"/>
+        <a:font script="Lisu" typeface="Segoe UI"/>
+        <a:font script="Mymr" typeface="Myanmar Text"/>
+        <a:font script="Nkoo" typeface="Ebrima"/>
+        <a:font script="Olck" typeface="Nirmala UI"/>
+        <a:font script="Osma" typeface="Ebrima"/>
+        <a:font script="Phag" typeface="Phagspa"/>
+        <a:font script="Syrn" typeface="Estrangelo Edessa"/>
+        <a:font script="Syrj" typeface="Estrangelo Edessa"/>
+        <a:font script="Syre" typeface="Estrangelo Edessa"/>
+        <a:font script="Sora" typeface="Nirmala UI"/>
+        <a:font script="Tale" typeface="Microsoft Tai Le"/>
+        <a:font script="Talu" typeface="Microsoft New Tai Lue"/>
+        <a:font script="Tfng" typeface="Ebrima"/>
+      </a:majorFont>
+      <a:minorFont>
+        <a:latin typeface="Aptos" panose="02110004020202020204"/>
+        <a:ea typeface=""/>
+        <a:cs typeface=""/>
+        <a:font script="Jpan" typeface="游ゴシック"/>
+        <a:font script="Hang" typeface="맑은 고딕"/>
+        <a:font script="Hans" typeface="等线"/>
+        <a:font script="Hant" typeface="新細明體"/>
+        <a:font script="Arab" typeface="Arial"/>
+        <a:font script="Hebr" typeface="Arial"/>
+        <a:font script="Thai" typeface="Cordia New"/>
+        <a:font script="Ethi" typeface="Nyala"/>
+        <a:font script="Beng" typeface="Vrinda"/>
+        <a:font script="Gujr" typeface="Shruti"/>
+        <a:font script="Khmr" typeface="DaunPenh"/>
+        <a:font script="Knda" typeface="Tunga"/>
+        <a:font script="Guru" typeface="Raavi"/>
+        <a:font script="Cans" typeface="Euphemia"/>
+        <a:font script="Cher" typeface="Plantagenet Cherokee"/>
+        <a:font script="Yiii" typeface="Microsoft Yi Baiti"/>
+        <a:font script="Tibt" typeface="Microsoft Himalaya"/>
+        <a:font script="Thaa" typeface="MV Boli"/>
+        <a:font script="Deva" typeface="Mangal"/>
+        <a:font script="Telu" typeface="Gautami"/>
+        <a:font script="Taml" typeface="Latha"/>
+        <a:font script="Syrc" typeface="Estrangelo Edessa"/>
+        <a:font script="Orya" typeface="Kalinga"/>
+        <a:font script="Mlym" typeface="Kartika"/>
+        <a:font script="Laoo" typeface="DokChampa"/>
+        <a:font script="Sinh" typeface="Iskoola Pota"/>
+        <a:font script="Mong" typeface="Mongolian Baiti"/>
+        <a:font script="Viet" typeface="Arial"/>
+        <a:font script="Uigh" typeface="Microsoft Uighur"/>
+        <a:font script="Geor" typeface="Sylfaen"/>
+        <a:font script="Armn" typeface="Arial"/>
+        <a:font script="Bugi" typeface="Leelawadee UI"/>
+        <a:font script="Bopo" typeface="Microsoft JhengHei"/>
+        <a:font script="Java" typeface="Javanese Text"/>
+        <a:font script="Lisu" typeface="Segoe UI"/>
+        <a:font script="Mymr" typeface="Myanmar Text"/>
+        <a:font script="Nkoo" typeface="Ebrima"/>
+        <a:font script="Olck" typeface="Nirmala UI"/>
+        <a:font script="Osma" typeface="Ebrima"/>
+        <a:font script="Phag" typeface="Phagspa"/>
+        <a:font script="Syrn" typeface="Estrangelo Edessa"/>
+        <a:font script="Syrj" typeface="Estrangelo Edessa"/>
+        <a:font script="Syre" typeface="Estrangelo Edessa"/>
+        <a:font script="Sora" typeface="Nirmala UI"/>
+        <a:font script="Tale" typeface="Microsoft Tai Le"/>
+        <a:font script="Talu" typeface="Microsoft New Tai Lue"/>
+        <a:font script="Tfng" typeface="Ebrima"/>
+      </a:minorFont>
+    </a:fontScheme>
+    <a:fmtScheme name="Office">
+      <a:fillStyleLst>
+        <a:solidFill>
+          <a:schemeClr val="phClr"/>
+        </a:solidFill>
+        <a:gradFill rotWithShape="1">
+          <a:gsLst>
+            <a:gs pos="0">
+              <a:schemeClr val="phClr">
+                <a:lumMod val="110000"/>
+                <a:satMod val="105000"/>
+                <a:tint val="67000"/>
+              </a:schemeClr>
+            </a:gs>
+            <a:gs pos="50000">
+              <a:schemeClr val="phClr">
+                <a:lumMod val="105000"/>
+                <a:satMod val="103000"/>
+                <a:tint val="73000"/>
+              </a:schemeClr>
+            </a:gs>
+            <a:gs pos="100000">
+              <a:schemeClr val="phClr">
+                <a:lumMod val="105000"/>
+                <a:satMod val="109000"/>
+                <a:tint val="81000"/>
+              </a:schemeClr>
+            </a:gs>
+          </a:gsLst>
+          <a:lin ang="5400000" scaled="0"/>
+        </a:gradFill>
+        <a:gradFill rotWithShape="1">
+          <a:gsLst>
+            <a:gs pos="0">
+              <a:schemeClr val="phClr">
+                <a:satMod val="103000"/>
+                <a:lumMod val="102000"/>
+                <a:tint val="94000"/>
+              </a:schemeClr>
+            </a:gs>
+            <a:gs pos="50000">
+              <a:schemeClr val="phClr">
+                <a:satMod val="110000"/>
+                <a:lumMod val="100000"/>
+                <a:shade val="100000"/>
+              </a:schemeClr>
+            </a:gs>
+            <a:gs pos="100000">
+              <a:schemeClr val="phClr">
+                <a:lumMod val="99000"/>
+                <a:satMod val="120000"/>
+                <a:shade val="78000"/>
+              </a:schemeClr>
+            </a:gs>
+          </a:gsLst>
+          <a:lin ang="5400000" scaled="0"/>
+        </a:gradFill>
+      </a:fillStyleLst>
+      <a:lnStyleLst>
+        <a:ln w="12700" cap="flat" cmpd="sng" algn="ctr">
+          <a:solidFill>
+            <a:schemeClr val="phClr"/>
+          </a:solidFill>
+          <a:prstDash val="solid"/>
+          <a:miter lim="800000"/>
+        </a:ln>
+        <a:ln w="19050" cap="flat" cmpd="sng" algn="ctr">
+          <a:solidFill>
+            <a:schemeClr val="phClr"/>
+          </a:solidFill>
+          <a:prstDash val="solid"/>
+          <a:miter lim="800000"/>
+        </a:ln>
+        <a:ln w="25400" cap="flat" cmpd="sng" algn="ctr">
+          <a:solidFill>
+            <a:schemeClr val="phClr"/>
+          </a:solidFill>
+          <a:prstDash val="solid"/>
+          <a:miter lim="800000"/>
+        </a:ln>
+      </a:lnStyleLst>
+      <a:effectStyleLst>
+        <a:effectStyle>
+          <a:effectLst/>
+        </a:effectStyle>
+        <a:effectStyle>
+          <a:effectLst/>
+        </a:effectStyle>
+        <a:effectStyle>
+          <a:effectLst>
+            <a:outerShdw blurRad="57150" dist="19050" dir="5400000" algn="ctr" rotWithShape="0">
+              <a:srgbClr val="000000">
+                <a:alpha val="63000"/>
+              </a:srgbClr>
+            </a:outerShdw>
+          </a:effectLst>
+        </a:effectStyle>
+      </a:effectStyleLst>
+      <a:bgFillStyleLst>
+        <a:solidFill>
+          <a:schemeClr val="phClr"/>
+        </a:solidFill>
+        <a:solidFill>
+          <a:schemeClr val="phClr">
+            <a:tint val="95000"/>
+            <a:satMod val="170000"/>
+          </a:schemeClr>
+        </a:solidFill>
+        <a:gradFill rotWithShape="1">
+          <a:gsLst>
+            <a:gs pos="0">
+              <a:schemeClr val="phClr">
+                <a:tint val="93000"/>
+                <a:satMod val="150000"/>
+                <a:shade val="98000"/>
+                <a:lumMod val="102000"/>
+              </a:schemeClr>
+            </a:gs>
+            <a:gs pos="50000">
+              <a:schemeClr val="phClr">
+                <a:tint val="98000"/>
+                <a:satMod val="130000"/>
+                <a:shade val="90000"/>
+                <a:lumMod val="103000"/>
+              </a:schemeClr>
+            </a:gs>
+            <a:gs pos="100000">
+              <a:schemeClr val="phClr">
+                <a:shade val="63000"/>
+                <a:satMod val="120000"/>
+              </a:schemeClr>
+            </a:gs>
+          </a:gsLst>
+          <a:lin ang="5400000" scaled="0"/>
+        </a:gradFill>
+      </a:bgFillStyleLst>
+    </a:fmtScheme>
+  </a:themeElements>
+  <a:objectDefaults>
+    <a:lnDef>
+      <a:spPr/>
+      <a:bodyPr/>
+      <a:lstStyle/>
+      <a:style>
+        <a:lnRef idx="2">
+          <a:schemeClr val="accent1"/>
+        </a:lnRef>
+        <a:fillRef idx="0">
+          <a:schemeClr val="accent1"/>
+        </a:fillRef>
+        <a:effectRef idx="1">
+          <a:schemeClr val="accent1"/>
+        </a:effectRef>
+        <a:fontRef idx="minor">
+          <a:schemeClr val="tx1"/>
+        </a:fontRef>
+      </a:style>
+    </a:lnDef>
+  </a:objectDefaults>
+  <a:extraClrSchemeLst/>
+  <a:extLst>
+    <a:ext uri="{05A4C25C-085E-4340-85A3-A5531E510DB2}">
+      <thm15:themeFamily xmlns:thm15="http://schemas.microsoft.com/office/thememl/2012/main" name="Office Theme" id="{2E142A2C-CD16-42D6-873A-C26D2A0506FA}" vid="{1BDDFF52-6CD6-40A5-AB3C-68EB2F1E4D0A}"/>
+    </a:ext>
+  </a:extLst>
+</a:theme>
 </file>
</xml_diff>

<commit_message>
HLD updated and code cleanup
</commit_message>
<xml_diff>
--- a/resources/High Level Design.pptx
+++ b/resources/High Level Design.pptx
@@ -5,7 +5,7 @@
     <p:sldMasterId id="2147483648" r:id="rId1"/>
   </p:sldMasterIdLst>
   <p:notesMasterIdLst>
-    <p:notesMasterId r:id="rId11"/>
+    <p:notesMasterId r:id="rId12"/>
   </p:notesMasterIdLst>
   <p:sldIdLst>
     <p:sldId id="256" r:id="rId2"/>
@@ -15,8 +15,9 @@
     <p:sldId id="261" r:id="rId6"/>
     <p:sldId id="257" r:id="rId7"/>
     <p:sldId id="264" r:id="rId8"/>
-    <p:sldId id="263" r:id="rId9"/>
-    <p:sldId id="258" r:id="rId10"/>
+    <p:sldId id="265" r:id="rId9"/>
+    <p:sldId id="263" r:id="rId10"/>
+    <p:sldId id="258" r:id="rId11"/>
   </p:sldIdLst>
   <p:sldSz cx="12192000" cy="6858000"/>
   <p:notesSz cx="6858000" cy="9144000"/>
@@ -537,7 +538,7 @@
           <a:p>
             <a:fld id="{0127424B-7579-4C2C-B004-84317CBC7A91}" type="slidenum">
               <a:rPr lang="en-US" smtClean="0"/>
-              <a:t>8</a:t>
+              <a:t>9</a:t>
             </a:fld>
             <a:endParaRPr lang="en-US"/>
           </a:p>
@@ -3839,6 +3840,92 @@
 </p:sld>
 </file>
 
+<file path=ppt/slides/slide10.xml><?xml version="1.0" encoding="utf-8"?>
+<p:sld xmlns:a="http://schemas.openxmlformats.org/drawingml/2006/main" xmlns:r="http://schemas.openxmlformats.org/officeDocument/2006/relationships" xmlns:p="http://schemas.openxmlformats.org/presentationml/2006/main">
+  <p:cSld>
+    <p:spTree>
+      <p:nvGrpSpPr>
+        <p:cNvPr id="1" name=""/>
+        <p:cNvGrpSpPr/>
+        <p:nvPr/>
+      </p:nvGrpSpPr>
+      <p:grpSpPr>
+        <a:xfrm>
+          <a:off x="0" y="0"/>
+          <a:ext cx="0" cy="0"/>
+          <a:chOff x="0" y="0"/>
+          <a:chExt cx="0" cy="0"/>
+        </a:xfrm>
+      </p:grpSpPr>
+      <p:sp>
+        <p:nvSpPr>
+          <p:cNvPr id="2" name="Title 1">
+            <a:extLst>
+              <a:ext uri="{FF2B5EF4-FFF2-40B4-BE49-F238E27FC236}">
+                <a16:creationId xmlns:a16="http://schemas.microsoft.com/office/drawing/2014/main" id="{20AB3A41-8B53-4FE4-C59F-64D67745511F}"/>
+              </a:ext>
+            </a:extLst>
+          </p:cNvPr>
+          <p:cNvSpPr>
+            <a:spLocks noGrp="1"/>
+          </p:cNvSpPr>
+          <p:nvPr>
+            <p:ph type="title"/>
+          </p:nvPr>
+        </p:nvSpPr>
+        <p:spPr/>
+        <p:txBody>
+          <a:bodyPr/>
+          <a:lstStyle/>
+          <a:p>
+            <a:r>
+              <a:rPr lang="en-US" dirty="0"/>
+              <a:t>Ideas for future updates</a:t>
+            </a:r>
+          </a:p>
+        </p:txBody>
+      </p:sp>
+      <p:sp>
+        <p:nvSpPr>
+          <p:cNvPr id="3" name="Content Placeholder 2">
+            <a:extLst>
+              <a:ext uri="{FF2B5EF4-FFF2-40B4-BE49-F238E27FC236}">
+                <a16:creationId xmlns:a16="http://schemas.microsoft.com/office/drawing/2014/main" id="{B188AECD-C15F-A712-B8DC-15FDA0FDEC15}"/>
+              </a:ext>
+            </a:extLst>
+          </p:cNvPr>
+          <p:cNvSpPr>
+            <a:spLocks noGrp="1"/>
+          </p:cNvSpPr>
+          <p:nvPr>
+            <p:ph idx="1"/>
+          </p:nvPr>
+        </p:nvSpPr>
+        <p:spPr/>
+        <p:txBody>
+          <a:bodyPr/>
+          <a:lstStyle/>
+          <a:p>
+            <a:r>
+              <a:rPr lang="en-US" dirty="0"/>
+              <a:t>Automated/manual queue reordering based on priority/dates</a:t>
+            </a:r>
+          </a:p>
+        </p:txBody>
+      </p:sp>
+    </p:spTree>
+    <p:extLst>
+      <p:ext uri="{BB962C8B-B14F-4D97-AF65-F5344CB8AC3E}">
+        <p14:creationId xmlns:p14="http://schemas.microsoft.com/office/powerpoint/2010/main" val="3310321507"/>
+      </p:ext>
+    </p:extLst>
+  </p:cSld>
+  <p:clrMapOvr>
+    <a:masterClrMapping/>
+  </p:clrMapOvr>
+</p:sld>
+</file>
+
 <file path=ppt/slides/slide2.xml><?xml version="1.0" encoding="utf-8"?>
 <p:sld xmlns:a="http://schemas.openxmlformats.org/drawingml/2006/main" xmlns:r="http://schemas.openxmlformats.org/officeDocument/2006/relationships" xmlns:p="http://schemas.openxmlformats.org/presentationml/2006/main">
   <p:cSld>
@@ -4526,7 +4613,7 @@
           <a:p>
             <a:r>
               <a:rPr lang="en-US" dirty="0"/>
-              <a:t>User experience/interface notes</a:t>
+              <a:t>User experience notes</a:t>
             </a:r>
           </a:p>
         </p:txBody>
@@ -4617,14 +4704,19 @@
             <p:ph type="title"/>
           </p:nvPr>
         </p:nvSpPr>
-        <p:spPr/>
+        <p:spPr>
+          <a:xfrm>
+            <a:off x="838200" y="120681"/>
+            <a:ext cx="10515600" cy="1325563"/>
+          </a:xfrm>
+        </p:spPr>
         <p:txBody>
           <a:bodyPr/>
           <a:lstStyle/>
           <a:p>
             <a:r>
               <a:rPr lang="en-US" dirty="0"/>
-              <a:t>Key implementation notes</a:t>
+              <a:t>Example:</a:t>
             </a:r>
           </a:p>
         </p:txBody>
@@ -4645,73 +4737,60 @@
             <p:ph idx="1"/>
           </p:nvPr>
         </p:nvSpPr>
-        <p:spPr/>
-        <p:txBody>
-          <a:bodyPr>
-            <a:normAutofit fontScale="92500" lnSpcReduction="20000"/>
-          </a:bodyPr>
-          <a:lstStyle/>
-          <a:p>
+        <p:spPr>
+          <a:xfrm>
+            <a:off x="838200" y="1581181"/>
+            <a:ext cx="10515600" cy="4351338"/>
+          </a:xfrm>
+        </p:spPr>
+        <p:txBody>
+          <a:bodyPr/>
+          <a:lstStyle/>
+          <a:p>
+            <a:pPr marL="0" indent="0">
+              <a:buNone/>
+            </a:pPr>
             <a:r>
               <a:rPr lang="en-US" dirty="0"/>
-              <a:t>Usage of </a:t>
-            </a:r>
-            <a:r>
-              <a:rPr lang="en-US" dirty="0" err="1"/>
-              <a:t>Arraylists</a:t>
-            </a:r>
-            <a:r>
-              <a:rPr lang="en-US" dirty="0"/>
-              <a:t> for task queues</a:t>
-            </a:r>
-          </a:p>
-          <a:p>
-            <a:r>
-              <a:rPr lang="en-US" dirty="0"/>
-              <a:t>Usage of </a:t>
-            </a:r>
-            <a:r>
-              <a:rPr lang="en-US" dirty="0" err="1"/>
-              <a:t>Hashmap</a:t>
-            </a:r>
-            <a:r>
-              <a:rPr lang="en-US" dirty="0"/>
-              <a:t> to store a map of all users as a searchable database</a:t>
-            </a:r>
-          </a:p>
-          <a:p>
-            <a:r>
-              <a:rPr lang="en-US" dirty="0"/>
-              <a:t>Usage of String operations and date formatting operations for task details.</a:t>
-            </a:r>
-          </a:p>
-          <a:p>
-            <a:r>
-              <a:rPr lang="en-US" dirty="0"/>
-              <a:t>Usage of a basic self-developed hash function to skip storing actual passwords for added security</a:t>
-            </a:r>
-          </a:p>
-          <a:p>
-            <a:r>
-              <a:rPr lang="en-US" dirty="0"/>
-              <a:t>Most of the possible exceptions are handled in a way that the application is robust and users can keep retrying their actions without the application breaking/stopping.</a:t>
-            </a:r>
-          </a:p>
-          <a:p>
-            <a:r>
-              <a:rPr lang="en-US" dirty="0"/>
-              <a:t>No AI help was taken. Although a lot of learning happened on the fly, all of the code is handwritten.</a:t>
-            </a:r>
-          </a:p>
-          <a:p>
-            <a:endParaRPr lang="en-US" dirty="0"/>
-          </a:p>
-        </p:txBody>
-      </p:sp>
+              <a:t>Yellow = system output</a:t>
+            </a:r>
+          </a:p>
+        </p:txBody>
+      </p:sp>
+      <p:pic>
+        <p:nvPicPr>
+          <p:cNvPr id="5" name="Picture 4">
+            <a:extLst>
+              <a:ext uri="{FF2B5EF4-FFF2-40B4-BE49-F238E27FC236}">
+                <a16:creationId xmlns:a16="http://schemas.microsoft.com/office/drawing/2014/main" id="{91D25B03-6F4D-0607-14B6-A6DD1E265A48}"/>
+              </a:ext>
+            </a:extLst>
+          </p:cNvPr>
+          <p:cNvPicPr>
+            <a:picLocks noChangeAspect="1"/>
+          </p:cNvPicPr>
+          <p:nvPr/>
+        </p:nvPicPr>
+        <p:blipFill>
+          <a:blip r:embed="rId2"/>
+          <a:stretch>
+            <a:fillRect/>
+          </a:stretch>
+        </p:blipFill>
+        <p:spPr>
+          <a:xfrm>
+            <a:off x="959668" y="2105403"/>
+            <a:ext cx="10085560" cy="4612648"/>
+          </a:xfrm>
+          <a:prstGeom prst="rect">
+            <a:avLst/>
+          </a:prstGeom>
+        </p:spPr>
+      </p:pic>
     </p:spTree>
     <p:extLst>
       <p:ext uri="{BB962C8B-B14F-4D97-AF65-F5344CB8AC3E}">
-        <p14:creationId xmlns:p14="http://schemas.microsoft.com/office/powerpoint/2010/main" val="613754538"/>
+        <p14:creationId xmlns:p14="http://schemas.microsoft.com/office/powerpoint/2010/main" val="1866961709"/>
       </p:ext>
     </p:extLst>
   </p:cSld>
@@ -4761,7 +4840,7 @@
           <a:p>
             <a:r>
               <a:rPr lang="en-US" dirty="0"/>
-              <a:t>Ideas for future updates</a:t>
+              <a:t>Key implementation notes</a:t>
             </a:r>
           </a:p>
         </p:txBody>
@@ -4782,22 +4861,84 @@
             <p:ph idx="1"/>
           </p:nvPr>
         </p:nvSpPr>
-        <p:spPr/>
-        <p:txBody>
-          <a:bodyPr/>
-          <a:lstStyle/>
-          <a:p>
-            <a:r>
-              <a:rPr lang="en-US" dirty="0"/>
-              <a:t>Automated/manual queue reordering based on priority/dates</a:t>
-            </a:r>
+        <p:spPr>
+          <a:xfrm>
+            <a:off x="838200" y="1690688"/>
+            <a:ext cx="10515600" cy="4802187"/>
+          </a:xfrm>
+        </p:spPr>
+        <p:txBody>
+          <a:bodyPr>
+            <a:normAutofit lnSpcReduction="10000"/>
+          </a:bodyPr>
+          <a:lstStyle/>
+          <a:p>
+            <a:r>
+              <a:rPr lang="en-US" sz="2400" dirty="0"/>
+              <a:t>Usage of </a:t>
+            </a:r>
+            <a:r>
+              <a:rPr lang="en-US" sz="2400" dirty="0" err="1"/>
+              <a:t>Arraylists</a:t>
+            </a:r>
+            <a:r>
+              <a:rPr lang="en-US" sz="2400" dirty="0"/>
+              <a:t> for task queues.</a:t>
+            </a:r>
+          </a:p>
+          <a:p>
+            <a:r>
+              <a:rPr lang="en-US" sz="2400" dirty="0"/>
+              <a:t>Usage of </a:t>
+            </a:r>
+            <a:r>
+              <a:rPr lang="en-US" sz="2400" dirty="0" err="1"/>
+              <a:t>Hashmap</a:t>
+            </a:r>
+            <a:r>
+              <a:rPr lang="en-US" sz="2400" dirty="0"/>
+              <a:t> to store a map of all users as a searchable database.</a:t>
+            </a:r>
+          </a:p>
+          <a:p>
+            <a:r>
+              <a:rPr lang="en-US" sz="2400" dirty="0"/>
+              <a:t>Usage of String operations and date formatting operations for task details.</a:t>
+            </a:r>
+          </a:p>
+          <a:p>
+            <a:r>
+              <a:rPr lang="en-US" sz="2400" dirty="0"/>
+              <a:t>Usage of a basic self-developed hash function to skip storing actual passwords for added security.</a:t>
+            </a:r>
+          </a:p>
+          <a:p>
+            <a:r>
+              <a:rPr lang="en-US" sz="2400" dirty="0"/>
+              <a:t>Usage of while(true) loops and break statements to keep the app running perpetually until user decides to exit.</a:t>
+            </a:r>
+          </a:p>
+          <a:p>
+            <a:r>
+              <a:rPr lang="en-US" sz="2400" dirty="0"/>
+              <a:t>Handling of most of the possible exceptions in a way that the application is robust and users can keep retrying their actions without the application breaking/stopping.</a:t>
+            </a:r>
+          </a:p>
+          <a:p>
+            <a:r>
+              <a:rPr lang="en-US" sz="2400" dirty="0"/>
+              <a:t>No AI help was taken. Although a lot of learning happened on the fly from online non-AI resources, all of the code is handwritten.</a:t>
+            </a:r>
+          </a:p>
+          <a:p>
+            <a:endParaRPr lang="en-US" sz="2400" dirty="0"/>
           </a:p>
         </p:txBody>
       </p:sp>
     </p:spTree>
     <p:extLst>
       <p:ext uri="{BB962C8B-B14F-4D97-AF65-F5344CB8AC3E}">
-        <p14:creationId xmlns:p14="http://schemas.microsoft.com/office/powerpoint/2010/main" val="3310321507"/>
+        <p14:creationId xmlns:p14="http://schemas.microsoft.com/office/powerpoint/2010/main" val="613754538"/>
       </p:ext>
     </p:extLst>
   </p:cSld>

</xml_diff>

<commit_message>
updated high level design document
</commit_message>
<xml_diff>
--- a/resources/High Level Design.pptx
+++ b/resources/High Level Design.pptx
@@ -4101,7 +4101,7 @@
           <a:p>
             <a:r>
               <a:rPr lang="en-US" dirty="0"/>
-              <a:t>A User contains following information</a:t>
+              <a:t>A User can do these actions</a:t>
             </a:r>
           </a:p>
           <a:p>
@@ -4752,7 +4752,7 @@
             </a:pPr>
             <a:r>
               <a:rPr lang="en-US" dirty="0"/>
-              <a:t>Yellow = system output</a:t>
+              <a:t>Green = user input</a:t>
             </a:r>
           </a:p>
         </p:txBody>

</xml_diff>